<commit_message>
Addressing comments from Kapil
</commit_message>
<xml_diff>
--- a/inference/docs/images/diagrams.pptx
+++ b/inference/docs/images/diagrams.pptx
@@ -106,6 +106,11 @@
       </a:defRPr>
     </a:lvl9pPr>
   </p:defaultTextStyle>
+  <p:extLst>
+    <p:ext uri="{EFAFB233-063F-42B5-8137-9DF3F51BA10A}">
+      <p15:sldGuideLst xmlns:p15="http://schemas.microsoft.com/office/powerpoint/2012/main"/>
+    </p:ext>
+  </p:extLst>
 </p:presentation>
 </file>
 
@@ -258,7 +263,7 @@
           <a:p>
             <a:fld id="{0ABD564D-309D-4998-9096-446EF35F8F13}" type="datetimeFigureOut">
               <a:rPr lang="en-GB" smtClean="0"/>
-              <a:t>17/02/2023</a:t>
+              <a:t>20/02/2023</a:t>
             </a:fld>
             <a:endParaRPr lang="en-GB"/>
           </a:p>
@@ -458,7 +463,7 @@
           <a:p>
             <a:fld id="{0ABD564D-309D-4998-9096-446EF35F8F13}" type="datetimeFigureOut">
               <a:rPr lang="en-GB" smtClean="0"/>
-              <a:t>17/02/2023</a:t>
+              <a:t>20/02/2023</a:t>
             </a:fld>
             <a:endParaRPr lang="en-GB"/>
           </a:p>
@@ -668,7 +673,7 @@
           <a:p>
             <a:fld id="{0ABD564D-309D-4998-9096-446EF35F8F13}" type="datetimeFigureOut">
               <a:rPr lang="en-GB" smtClean="0"/>
-              <a:t>17/02/2023</a:t>
+              <a:t>20/02/2023</a:t>
             </a:fld>
             <a:endParaRPr lang="en-GB"/>
           </a:p>
@@ -868,7 +873,7 @@
           <a:p>
             <a:fld id="{0ABD564D-309D-4998-9096-446EF35F8F13}" type="datetimeFigureOut">
               <a:rPr lang="en-GB" smtClean="0"/>
-              <a:t>17/02/2023</a:t>
+              <a:t>20/02/2023</a:t>
             </a:fld>
             <a:endParaRPr lang="en-GB"/>
           </a:p>
@@ -1144,7 +1149,7 @@
           <a:p>
             <a:fld id="{0ABD564D-309D-4998-9096-446EF35F8F13}" type="datetimeFigureOut">
               <a:rPr lang="en-GB" smtClean="0"/>
-              <a:t>17/02/2023</a:t>
+              <a:t>20/02/2023</a:t>
             </a:fld>
             <a:endParaRPr lang="en-GB"/>
           </a:p>
@@ -1412,7 +1417,7 @@
           <a:p>
             <a:fld id="{0ABD564D-309D-4998-9096-446EF35F8F13}" type="datetimeFigureOut">
               <a:rPr lang="en-GB" smtClean="0"/>
-              <a:t>17/02/2023</a:t>
+              <a:t>20/02/2023</a:t>
             </a:fld>
             <a:endParaRPr lang="en-GB"/>
           </a:p>
@@ -1827,7 +1832,7 @@
           <a:p>
             <a:fld id="{0ABD564D-309D-4998-9096-446EF35F8F13}" type="datetimeFigureOut">
               <a:rPr lang="en-GB" smtClean="0"/>
-              <a:t>17/02/2023</a:t>
+              <a:t>20/02/2023</a:t>
             </a:fld>
             <a:endParaRPr lang="en-GB"/>
           </a:p>
@@ -1969,7 +1974,7 @@
           <a:p>
             <a:fld id="{0ABD564D-309D-4998-9096-446EF35F8F13}" type="datetimeFigureOut">
               <a:rPr lang="en-GB" smtClean="0"/>
-              <a:t>17/02/2023</a:t>
+              <a:t>20/02/2023</a:t>
             </a:fld>
             <a:endParaRPr lang="en-GB"/>
           </a:p>
@@ -2082,7 +2087,7 @@
           <a:p>
             <a:fld id="{0ABD564D-309D-4998-9096-446EF35F8F13}" type="datetimeFigureOut">
               <a:rPr lang="en-GB" smtClean="0"/>
-              <a:t>17/02/2023</a:t>
+              <a:t>20/02/2023</a:t>
             </a:fld>
             <a:endParaRPr lang="en-GB"/>
           </a:p>
@@ -2395,7 +2400,7 @@
           <a:p>
             <a:fld id="{0ABD564D-309D-4998-9096-446EF35F8F13}" type="datetimeFigureOut">
               <a:rPr lang="en-GB" smtClean="0"/>
-              <a:t>17/02/2023</a:t>
+              <a:t>20/02/2023</a:t>
             </a:fld>
             <a:endParaRPr lang="en-GB"/>
           </a:p>
@@ -2684,7 +2689,7 @@
           <a:p>
             <a:fld id="{0ABD564D-309D-4998-9096-446EF35F8F13}" type="datetimeFigureOut">
               <a:rPr lang="en-GB" smtClean="0"/>
-              <a:t>17/02/2023</a:t>
+              <a:t>20/02/2023</a:t>
             </a:fld>
             <a:endParaRPr lang="en-GB"/>
           </a:p>
@@ -2927,7 +2932,7 @@
           <a:p>
             <a:fld id="{0ABD564D-309D-4998-9096-446EF35F8F13}" type="datetimeFigureOut">
               <a:rPr lang="en-GB" smtClean="0"/>
-              <a:t>17/02/2023</a:t>
+              <a:t>20/02/2023</a:t>
             </a:fld>
             <a:endParaRPr lang="en-GB"/>
           </a:p>
@@ -5310,8 +5315,8 @@
         </p:nvSpPr>
         <p:spPr>
           <a:xfrm>
-            <a:off x="4198713" y="4457145"/>
-            <a:ext cx="665871" cy="596336"/>
+            <a:off x="5033432" y="4457145"/>
+            <a:ext cx="523337" cy="596336"/>
           </a:xfrm>
           <a:prstGeom prst="roundRect">
             <a:avLst>
@@ -5362,7 +5367,7 @@
               <a:defRPr/>
             </a:pPr>
             <a:r>
-              <a:rPr kumimoji="0" lang="en-US" sz="1100" b="0" i="0" u="none" strike="noStrike" kern="1200" cap="none" spc="0" normalizeH="0" baseline="0" noProof="0">
+              <a:rPr kumimoji="0" lang="en-US" sz="1100" b="0" i="0" u="none" strike="noStrike" kern="1200" cap="none" spc="0" normalizeH="0" baseline="0" noProof="0" dirty="0">
                 <a:ln>
                   <a:noFill/>
                 </a:ln>
@@ -5532,7 +5537,7 @@
               <a:defRPr/>
             </a:pPr>
             <a:r>
-              <a:rPr kumimoji="0" lang="en-US" sz="1100" b="0" i="0" u="none" strike="noStrike" kern="1200" cap="none" spc="0" normalizeH="0" baseline="0" noProof="0">
+              <a:rPr kumimoji="0" lang="en-US" sz="1100" b="0" i="0" u="none" strike="noStrike" kern="1200" cap="none" spc="0" normalizeH="0" baseline="0" noProof="0" dirty="0">
                 <a:ln>
                   <a:noFill/>
                 </a:ln>
@@ -5569,8 +5574,8 @@
         </p:nvCxnSpPr>
         <p:spPr>
           <a:xfrm rot="5400000" flipH="1" flipV="1">
-            <a:off x="4669293" y="3801527"/>
-            <a:ext cx="517974" cy="793262"/>
+            <a:off x="5264461" y="3969811"/>
+            <a:ext cx="517974" cy="456695"/>
           </a:xfrm>
           <a:prstGeom prst="bentConnector3">
             <a:avLst>
@@ -5615,8 +5620,8 @@
         </p:nvCxnSpPr>
         <p:spPr>
           <a:xfrm flipV="1">
-            <a:off x="6316887" y="2878896"/>
-            <a:ext cx="1524497" cy="861549"/>
+            <a:off x="6316886" y="2878896"/>
+            <a:ext cx="1524498" cy="861549"/>
           </a:xfrm>
           <a:prstGeom prst="bentConnector2">
             <a:avLst/>
@@ -5659,8 +5664,8 @@
         </p:nvCxnSpPr>
         <p:spPr>
           <a:xfrm flipV="1">
-            <a:off x="6316887" y="2878897"/>
-            <a:ext cx="2515943" cy="861548"/>
+            <a:off x="6316886" y="2878897"/>
+            <a:ext cx="2515944" cy="861548"/>
           </a:xfrm>
           <a:prstGeom prst="bentConnector2">
             <a:avLst/>
@@ -5684,134 +5689,6 @@
           </a:fontRef>
         </p:style>
       </p:cxnSp>
-      <p:sp>
-        <p:nvSpPr>
-          <p:cNvPr id="11" name="Rectangle: Rounded Corners 10">
-            <a:extLst>
-              <a:ext uri="{FF2B5EF4-FFF2-40B4-BE49-F238E27FC236}">
-                <a16:creationId xmlns:a16="http://schemas.microsoft.com/office/drawing/2014/main" id="{BB64A39C-42CB-BB24-BF05-D6DBD2ABFA26}"/>
-              </a:ext>
-            </a:extLst>
-          </p:cNvPr>
-          <p:cNvSpPr/>
-          <p:nvPr/>
-        </p:nvSpPr>
-        <p:spPr>
-          <a:xfrm>
-            <a:off x="4921734" y="4458324"/>
-            <a:ext cx="809012" cy="596336"/>
-          </a:xfrm>
-          <a:prstGeom prst="roundRect">
-            <a:avLst>
-              <a:gd name="adj" fmla="val 3176"/>
-            </a:avLst>
-          </a:prstGeom>
-          <a:solidFill>
-            <a:schemeClr val="accent2">
-              <a:lumMod val="60000"/>
-              <a:lumOff val="40000"/>
-            </a:schemeClr>
-          </a:solidFill>
-          <a:ln/>
-        </p:spPr>
-        <p:style>
-          <a:lnRef idx="2">
-            <a:schemeClr val="dk1"/>
-          </a:lnRef>
-          <a:fillRef idx="1">
-            <a:schemeClr val="lt1"/>
-          </a:fillRef>
-          <a:effectRef idx="0">
-            <a:schemeClr val="dk1"/>
-          </a:effectRef>
-          <a:fontRef idx="minor">
-            <a:schemeClr val="dk1"/>
-          </a:fontRef>
-        </p:style>
-        <p:txBody>
-          <a:bodyPr rtlCol="0" anchor="ctr"/>
-          <a:lstStyle/>
-          <a:p>
-            <a:pPr marL="0" marR="0" lvl="0" indent="0" algn="ctr" defTabSz="914367" rtl="0" eaLnBrk="1" fontAlgn="auto" latinLnBrk="0" hangingPunct="1">
-              <a:lnSpc>
-                <a:spcPct val="100000"/>
-              </a:lnSpc>
-              <a:spcBef>
-                <a:spcPts val="0"/>
-              </a:spcBef>
-              <a:spcAft>
-                <a:spcPts val="0"/>
-              </a:spcAft>
-              <a:buClrTx/>
-              <a:buSzTx/>
-              <a:buFontTx/>
-              <a:buNone/>
-              <a:tabLst/>
-              <a:defRPr/>
-            </a:pPr>
-            <a:r>
-              <a:rPr kumimoji="0" lang="en-US" sz="1100" b="0" i="0" u="none" strike="noStrike" kern="1200" cap="none" spc="0" normalizeH="0" baseline="0" noProof="0">
-                <a:ln>
-                  <a:noFill/>
-                </a:ln>
-                <a:solidFill>
-                  <a:srgbClr val="000000"/>
-                </a:solidFill>
-                <a:effectLst/>
-                <a:uLnTx/>
-                <a:uFillTx/>
-                <a:latin typeface="Segoe UI Semibold" panose="020B0702040204020203" pitchFamily="34" charset="0"/>
-                <a:ea typeface="+mn-ea"/>
-                <a:cs typeface="Segoe UI Semibold" panose="020B0702040204020203" pitchFamily="34" charset="0"/>
-              </a:rPr>
-              <a:t>Managed</a:t>
-            </a:r>
-          </a:p>
-          <a:p>
-            <a:pPr marL="0" marR="0" lvl="0" indent="0" algn="ctr" defTabSz="914367" rtl="0" eaLnBrk="1" fontAlgn="auto" latinLnBrk="0" hangingPunct="1">
-              <a:lnSpc>
-                <a:spcPct val="100000"/>
-              </a:lnSpc>
-              <a:spcBef>
-                <a:spcPts val="0"/>
-              </a:spcBef>
-              <a:spcAft>
-                <a:spcPts val="0"/>
-              </a:spcAft>
-              <a:buClrTx/>
-              <a:buSzTx/>
-              <a:buFontTx/>
-              <a:buNone/>
-              <a:tabLst/>
-              <a:defRPr/>
-            </a:pPr>
-            <a:r>
-              <a:rPr lang="en-US" sz="1100">
-                <a:solidFill>
-                  <a:srgbClr val="000000"/>
-                </a:solidFill>
-                <a:latin typeface="Segoe UI Semibold" panose="020B0702040204020203" pitchFamily="34" charset="0"/>
-                <a:cs typeface="Segoe UI Semibold" panose="020B0702040204020203" pitchFamily="34" charset="0"/>
-              </a:rPr>
-              <a:t>Identity</a:t>
-            </a:r>
-            <a:endParaRPr kumimoji="0" lang="en-US" sz="1100" b="0" i="0" u="none" strike="noStrike" kern="1200" cap="none" spc="0" normalizeH="0" baseline="0" noProof="0">
-              <a:ln>
-                <a:noFill/>
-              </a:ln>
-              <a:solidFill>
-                <a:srgbClr val="000000"/>
-              </a:solidFill>
-              <a:effectLst/>
-              <a:uLnTx/>
-              <a:uFillTx/>
-              <a:latin typeface="Segoe UI Semibold" panose="020B0702040204020203" pitchFamily="34" charset="0"/>
-              <a:ea typeface="+mn-ea"/>
-              <a:cs typeface="Segoe UI Semibold" panose="020B0702040204020203" pitchFamily="34" charset="0"/>
-            </a:endParaRPr>
-          </a:p>
-        </p:txBody>
-      </p:sp>
       <p:cxnSp>
         <p:nvCxnSpPr>
           <p:cNvPr id="12" name="Straight Connector 11">
@@ -5863,8 +5740,8 @@
         </p:nvSpPr>
         <p:spPr>
           <a:xfrm>
-            <a:off x="4332935" y="3541719"/>
-            <a:ext cx="1983952" cy="397452"/>
+            <a:off x="5186706" y="3541719"/>
+            <a:ext cx="1130180" cy="397452"/>
           </a:xfrm>
           <a:prstGeom prst="roundRect">
             <a:avLst>
@@ -5929,60 +5806,11 @@
                 <a:ea typeface="+mn-ea"/>
                 <a:cs typeface="Segoe UI Semibold" panose="020B0702040204020203" pitchFamily="34" charset="0"/>
               </a:rPr>
-              <a:t>STORAGE SIDECAR</a:t>
-            </a:r>
-          </a:p>
-        </p:txBody>
-      </p:sp>
-      <p:sp>
-        <p:nvSpPr>
-          <p:cNvPr id="14" name="Rectangle: Rounded Corners 13">
-            <a:extLst>
-              <a:ext uri="{FF2B5EF4-FFF2-40B4-BE49-F238E27FC236}">
-                <a16:creationId xmlns:a16="http://schemas.microsoft.com/office/drawing/2014/main" id="{7C2E80FC-2359-192C-6809-3A14E1177DEB}"/>
-              </a:ext>
-            </a:extLst>
-          </p:cNvPr>
-          <p:cNvSpPr/>
-          <p:nvPr/>
-        </p:nvSpPr>
-        <p:spPr>
-          <a:xfrm>
-            <a:off x="4332935" y="2625920"/>
-            <a:ext cx="772949" cy="795648"/>
-          </a:xfrm>
-          <a:prstGeom prst="roundRect">
-            <a:avLst>
-              <a:gd name="adj" fmla="val 0"/>
-            </a:avLst>
-          </a:prstGeom>
-          <a:solidFill>
-            <a:schemeClr val="accent3">
-              <a:lumMod val="20000"/>
-              <a:lumOff val="80000"/>
-            </a:schemeClr>
-          </a:solidFill>
-          <a:ln/>
-        </p:spPr>
-        <p:style>
-          <a:lnRef idx="2">
-            <a:schemeClr val="dk1"/>
-          </a:lnRef>
-          <a:fillRef idx="1">
-            <a:schemeClr val="lt1"/>
-          </a:fillRef>
-          <a:effectRef idx="0">
-            <a:schemeClr val="dk1"/>
-          </a:effectRef>
-          <a:fontRef idx="minor">
-            <a:schemeClr val="dk1"/>
-          </a:fontRef>
-        </p:style>
-        <p:txBody>
-          <a:bodyPr rtlCol="0" anchor="ctr"/>
-          <a:lstStyle/>
-          <a:p>
-            <a:pPr marL="0" marR="0" lvl="0" indent="0" algn="ctr" defTabSz="914367" rtl="0" eaLnBrk="1" fontAlgn="auto" latinLnBrk="0" hangingPunct="1">
+              <a:t>STORAGE </a:t>
+            </a:r>
+          </a:p>
+          <a:p>
+            <a:pPr marL="0" marR="0" lvl="0" indent="0" defTabSz="914367" rtl="0" eaLnBrk="1" fontAlgn="auto" latinLnBrk="0" hangingPunct="1">
               <a:lnSpc>
                 <a:spcPct val="100000"/>
               </a:lnSpc>
@@ -6000,7 +5828,17 @@
               <a:defRPr/>
             </a:pPr>
             <a:r>
-              <a:rPr kumimoji="0" lang="en-US" sz="1100" b="0" i="0" u="none" strike="noStrike" kern="1200" cap="none" spc="0" normalizeH="0" baseline="0" noProof="0">
+              <a:rPr lang="en-US" sz="1100" dirty="0">
+                <a:solidFill>
+                  <a:srgbClr val="000000"/>
+                </a:solidFill>
+                <a:latin typeface="Segoe UI Semibold" panose="020B0702040204020203" pitchFamily="34" charset="0"/>
+                <a:cs typeface="Segoe UI Semibold" panose="020B0702040204020203" pitchFamily="34" charset="0"/>
+              </a:rPr>
+              <a:t>S</a:t>
+            </a:r>
+            <a:r>
+              <a:rPr kumimoji="0" lang="en-US" sz="1100" b="0" i="0" u="none" strike="noStrike" kern="1200" cap="none" spc="0" normalizeH="0" baseline="0" noProof="0" dirty="0">
                 <a:ln>
                   <a:noFill/>
                 </a:ln>
@@ -6014,7 +5852,7 @@
                 <a:ea typeface="+mn-ea"/>
                 <a:cs typeface="Segoe UI Semibold" panose="020B0702040204020203" pitchFamily="34" charset="0"/>
               </a:rPr>
-              <a:t>PROXY SIDECAR</a:t>
+              <a:t>IDECAR</a:t>
             </a:r>
           </a:p>
         </p:txBody>
@@ -6122,7 +5960,6 @@
           </p:cNvPr>
           <p:cNvCxnSpPr>
             <a:cxnSpLocks/>
-            <a:stCxn id="14" idx="3"/>
             <a:endCxn id="15" idx="1"/>
           </p:cNvCxnSpPr>
           <p:nvPr/>
@@ -6169,8 +6006,8 @@
         </p:nvSpPr>
         <p:spPr>
           <a:xfrm>
-            <a:off x="5785240" y="4457145"/>
-            <a:ext cx="642878" cy="596336"/>
+            <a:off x="5634567" y="4457145"/>
+            <a:ext cx="793551" cy="596336"/>
           </a:xfrm>
           <a:prstGeom prst="roundRect">
             <a:avLst>
@@ -6221,14 +6058,21 @@
               <a:defRPr/>
             </a:pPr>
             <a:r>
-              <a:rPr lang="en-US" sz="1100">
+              <a:rPr kumimoji="0" lang="en-US" sz="1100" b="0" i="0" u="none" strike="noStrike" kern="1200" cap="none" spc="0" normalizeH="0" baseline="0" noProof="0" dirty="0">
+                <a:ln>
+                  <a:noFill/>
+                </a:ln>
                 <a:solidFill>
                   <a:srgbClr val="000000"/>
                 </a:solidFill>
+                <a:effectLst/>
+                <a:uLnTx/>
+                <a:uFillTx/>
                 <a:latin typeface="Segoe UI Semibold" panose="020B0702040204020203" pitchFamily="34" charset="0"/>
+                <a:ea typeface="+mn-ea"/>
                 <a:cs typeface="Segoe UI Semibold" panose="020B0702040204020203" pitchFamily="34" charset="0"/>
               </a:rPr>
-              <a:t>Cert</a:t>
+              <a:t>Managed</a:t>
             </a:r>
           </a:p>
           <a:p>
@@ -6250,16 +6094,16 @@
               <a:defRPr/>
             </a:pPr>
             <a:r>
-              <a:rPr lang="en-US" sz="1100">
+              <a:rPr lang="en-US" sz="1100" dirty="0">
                 <a:solidFill>
                   <a:srgbClr val="000000"/>
                 </a:solidFill>
                 <a:latin typeface="Segoe UI Semibold" panose="020B0702040204020203" pitchFamily="34" charset="0"/>
                 <a:cs typeface="Segoe UI Semibold" panose="020B0702040204020203" pitchFamily="34" charset="0"/>
               </a:rPr>
-              <a:t>Cache</a:t>
-            </a:r>
-            <a:endParaRPr kumimoji="0" lang="en-US" sz="1100" b="0" i="0" u="none" strike="noStrike" kern="1200" cap="none" spc="0" normalizeH="0" baseline="0" noProof="0">
+              <a:t>Identity</a:t>
+            </a:r>
+            <a:endParaRPr kumimoji="0" lang="en-US" sz="1100" b="0" i="0" u="none" strike="noStrike" kern="1200" cap="none" spc="0" normalizeH="0" baseline="0" noProof="0" dirty="0">
               <a:ln>
                 <a:noFill/>
               </a:ln>
@@ -6294,54 +6138,8 @@
         </p:nvCxnSpPr>
         <p:spPr>
           <a:xfrm rot="16200000" flipV="1">
-            <a:off x="5456808" y="3807274"/>
-            <a:ext cx="517974" cy="781768"/>
-          </a:xfrm>
-          <a:prstGeom prst="bentConnector3">
-            <a:avLst>
-              <a:gd name="adj1" fmla="val 50000"/>
-            </a:avLst>
-          </a:prstGeom>
-          <a:ln>
-            <a:headEnd type="triangle" w="med" len="med"/>
-            <a:tailEnd type="triangle" w="med" len="med"/>
-          </a:ln>
-        </p:spPr>
-        <p:style>
-          <a:lnRef idx="1">
-            <a:schemeClr val="dk1"/>
-          </a:lnRef>
-          <a:fillRef idx="0">
-            <a:schemeClr val="dk1"/>
-          </a:fillRef>
-          <a:effectRef idx="0">
-            <a:schemeClr val="dk1"/>
-          </a:effectRef>
-          <a:fontRef idx="minor">
-            <a:schemeClr val="tx1"/>
-          </a:fontRef>
-        </p:style>
-      </p:cxnSp>
-      <p:cxnSp>
-        <p:nvCxnSpPr>
-          <p:cNvPr id="19" name="Connector: Elbow 18">
-            <a:extLst>
-              <a:ext uri="{FF2B5EF4-FFF2-40B4-BE49-F238E27FC236}">
-                <a16:creationId xmlns:a16="http://schemas.microsoft.com/office/drawing/2014/main" id="{A1D99302-95B3-1C5C-1EEB-ABF2041E3E16}"/>
-              </a:ext>
-            </a:extLst>
-          </p:cNvPr>
-          <p:cNvCxnSpPr>
-            <a:cxnSpLocks/>
-            <a:stCxn id="11" idx="0"/>
-            <a:endCxn id="13" idx="2"/>
-          </p:cNvCxnSpPr>
-          <p:nvPr/>
-        </p:nvCxnSpPr>
-        <p:spPr>
-          <a:xfrm rot="16200000" flipV="1">
-            <a:off x="5066000" y="4198083"/>
-            <a:ext cx="519153" cy="1329"/>
+            <a:off x="5632583" y="4058384"/>
+            <a:ext cx="517974" cy="279547"/>
           </a:xfrm>
           <a:prstGeom prst="bentConnector3">
             <a:avLst>
@@ -7286,7 +7084,6 @@
           <p:cNvCxnSpPr>
             <a:cxnSpLocks/>
             <a:stCxn id="44" idx="3"/>
-            <a:endCxn id="14" idx="1"/>
           </p:cNvCxnSpPr>
           <p:nvPr/>
         </p:nvCxnSpPr>
@@ -7713,7 +7510,7 @@
         </p:blipFill>
         <p:spPr>
           <a:xfrm>
-            <a:off x="5774898" y="3527875"/>
+            <a:off x="5889191" y="3527875"/>
             <a:ext cx="427424" cy="427424"/>
           </a:xfrm>
           <a:prstGeom prst="rect">
@@ -7721,6 +7518,289 @@
           </a:prstGeom>
         </p:spPr>
       </p:pic>
+      <p:cxnSp>
+        <p:nvCxnSpPr>
+          <p:cNvPr id="58" name="Connector: Elbow 57">
+            <a:extLst>
+              <a:ext uri="{FF2B5EF4-FFF2-40B4-BE49-F238E27FC236}">
+                <a16:creationId xmlns:a16="http://schemas.microsoft.com/office/drawing/2014/main" id="{76898D46-8C29-7912-423F-1EF8AE9EEFE3}"/>
+              </a:ext>
+            </a:extLst>
+          </p:cNvPr>
+          <p:cNvCxnSpPr>
+            <a:cxnSpLocks/>
+            <a:endCxn id="5" idx="1"/>
+          </p:cNvCxnSpPr>
+          <p:nvPr/>
+        </p:nvCxnSpPr>
+        <p:spPr>
+          <a:xfrm rot="16200000" flipH="1">
+            <a:off x="4471379" y="4193260"/>
+            <a:ext cx="811744" cy="312361"/>
+          </a:xfrm>
+          <a:prstGeom prst="bentConnector2">
+            <a:avLst/>
+          </a:prstGeom>
+          <a:ln>
+            <a:headEnd type="triangle" w="med" len="med"/>
+            <a:tailEnd type="triangle" w="med" len="med"/>
+          </a:ln>
+        </p:spPr>
+        <p:style>
+          <a:lnRef idx="1">
+            <a:schemeClr val="dk1"/>
+          </a:lnRef>
+          <a:fillRef idx="0">
+            <a:schemeClr val="dk1"/>
+          </a:fillRef>
+          <a:effectRef idx="0">
+            <a:schemeClr val="dk1"/>
+          </a:effectRef>
+          <a:fontRef idx="minor">
+            <a:schemeClr val="tx1"/>
+          </a:fontRef>
+        </p:style>
+      </p:cxnSp>
+      <p:cxnSp>
+        <p:nvCxnSpPr>
+          <p:cNvPr id="70" name="Straight Connector 69">
+            <a:extLst>
+              <a:ext uri="{FF2B5EF4-FFF2-40B4-BE49-F238E27FC236}">
+                <a16:creationId xmlns:a16="http://schemas.microsoft.com/office/drawing/2014/main" id="{4572B2A1-FABE-11CA-8BCA-AA17E0833451}"/>
+              </a:ext>
+            </a:extLst>
+          </p:cNvPr>
+          <p:cNvCxnSpPr/>
+          <p:nvPr/>
+        </p:nvCxnSpPr>
+        <p:spPr>
+          <a:xfrm>
+            <a:off x="4725787" y="3284914"/>
+            <a:ext cx="0" cy="403890"/>
+          </a:xfrm>
+          <a:prstGeom prst="line">
+            <a:avLst/>
+          </a:prstGeom>
+          <a:ln w="28575"/>
+        </p:spPr>
+        <p:style>
+          <a:lnRef idx="1">
+            <a:schemeClr val="accent1"/>
+          </a:lnRef>
+          <a:fillRef idx="0">
+            <a:schemeClr val="accent1"/>
+          </a:fillRef>
+          <a:effectRef idx="0">
+            <a:schemeClr val="accent1"/>
+          </a:effectRef>
+          <a:fontRef idx="minor">
+            <a:schemeClr val="tx1"/>
+          </a:fontRef>
+        </p:style>
+      </p:cxnSp>
+      <p:sp>
+        <p:nvSpPr>
+          <p:cNvPr id="71" name="Rectangle: Rounded Corners 70">
+            <a:extLst>
+              <a:ext uri="{FF2B5EF4-FFF2-40B4-BE49-F238E27FC236}">
+                <a16:creationId xmlns:a16="http://schemas.microsoft.com/office/drawing/2014/main" id="{D9E6FA02-B138-CFFB-E83F-FA8D2E1E4EC4}"/>
+              </a:ext>
+            </a:extLst>
+          </p:cNvPr>
+          <p:cNvSpPr/>
+          <p:nvPr/>
+        </p:nvSpPr>
+        <p:spPr>
+          <a:xfrm>
+            <a:off x="4336258" y="3546117"/>
+            <a:ext cx="769625" cy="397452"/>
+          </a:xfrm>
+          <a:prstGeom prst="roundRect">
+            <a:avLst>
+              <a:gd name="adj" fmla="val 0"/>
+            </a:avLst>
+          </a:prstGeom>
+          <a:solidFill>
+            <a:schemeClr val="accent3">
+              <a:lumMod val="20000"/>
+              <a:lumOff val="80000"/>
+            </a:schemeClr>
+          </a:solidFill>
+          <a:ln/>
+        </p:spPr>
+        <p:style>
+          <a:lnRef idx="2">
+            <a:schemeClr val="dk1"/>
+          </a:lnRef>
+          <a:fillRef idx="1">
+            <a:schemeClr val="lt1"/>
+          </a:fillRef>
+          <a:effectRef idx="0">
+            <a:schemeClr val="dk1"/>
+          </a:effectRef>
+          <a:fontRef idx="minor">
+            <a:schemeClr val="dk1"/>
+          </a:fontRef>
+        </p:style>
+        <p:txBody>
+          <a:bodyPr rtlCol="0" anchor="ctr"/>
+          <a:lstStyle/>
+          <a:p>
+            <a:pPr marL="0" marR="0" lvl="0" indent="0" defTabSz="914367" rtl="0" eaLnBrk="1" fontAlgn="auto" latinLnBrk="0" hangingPunct="1">
+              <a:lnSpc>
+                <a:spcPct val="100000"/>
+              </a:lnSpc>
+              <a:spcBef>
+                <a:spcPts val="0"/>
+              </a:spcBef>
+              <a:spcAft>
+                <a:spcPts val="0"/>
+              </a:spcAft>
+              <a:buClrTx/>
+              <a:buSzTx/>
+              <a:buFontTx/>
+              <a:buNone/>
+              <a:tabLst/>
+              <a:defRPr/>
+            </a:pPr>
+            <a:r>
+              <a:rPr kumimoji="0" lang="en-US" sz="1100" b="0" i="0" u="none" strike="noStrike" kern="1200" cap="none" spc="0" normalizeH="0" baseline="0" noProof="0" dirty="0">
+                <a:ln>
+                  <a:noFill/>
+                </a:ln>
+                <a:solidFill>
+                  <a:srgbClr val="000000"/>
+                </a:solidFill>
+                <a:effectLst/>
+                <a:uLnTx/>
+                <a:uFillTx/>
+                <a:latin typeface="Segoe UI Semibold" panose="020B0702040204020203" pitchFamily="34" charset="0"/>
+                <a:ea typeface="+mn-ea"/>
+                <a:cs typeface="Segoe UI Semibold" panose="020B0702040204020203" pitchFamily="34" charset="0"/>
+              </a:rPr>
+              <a:t>ATTEST</a:t>
+            </a:r>
+            <a:br>
+              <a:rPr kumimoji="0" lang="en-US" sz="1100" b="0" i="0" u="none" strike="noStrike" kern="1200" cap="none" spc="0" normalizeH="0" baseline="0" noProof="0" dirty="0">
+                <a:ln>
+                  <a:noFill/>
+                </a:ln>
+                <a:solidFill>
+                  <a:srgbClr val="000000"/>
+                </a:solidFill>
+                <a:effectLst/>
+                <a:uLnTx/>
+                <a:uFillTx/>
+                <a:latin typeface="Segoe UI Semibold" panose="020B0702040204020203" pitchFamily="34" charset="0"/>
+                <a:ea typeface="+mn-ea"/>
+                <a:cs typeface="Segoe UI Semibold" panose="020B0702040204020203" pitchFamily="34" charset="0"/>
+              </a:rPr>
+            </a:br>
+            <a:r>
+              <a:rPr kumimoji="0" lang="en-US" sz="1100" b="0" i="0" u="none" strike="noStrike" kern="1200" cap="none" spc="0" normalizeH="0" baseline="0" noProof="0" dirty="0">
+                <a:ln>
+                  <a:noFill/>
+                </a:ln>
+                <a:solidFill>
+                  <a:srgbClr val="000000"/>
+                </a:solidFill>
+                <a:effectLst/>
+                <a:uLnTx/>
+                <a:uFillTx/>
+                <a:latin typeface="Segoe UI Semibold" panose="020B0702040204020203" pitchFamily="34" charset="0"/>
+                <a:ea typeface="+mn-ea"/>
+                <a:cs typeface="Segoe UI Semibold" panose="020B0702040204020203" pitchFamily="34" charset="0"/>
+              </a:rPr>
+              <a:t>SIDECAR</a:t>
+            </a:r>
+          </a:p>
+        </p:txBody>
+      </p:sp>
+      <p:sp>
+        <p:nvSpPr>
+          <p:cNvPr id="72" name="Rectangle: Rounded Corners 71">
+            <a:extLst>
+              <a:ext uri="{FF2B5EF4-FFF2-40B4-BE49-F238E27FC236}">
+                <a16:creationId xmlns:a16="http://schemas.microsoft.com/office/drawing/2014/main" id="{2CA35F0D-FA3E-AC2F-774B-1652050BA92A}"/>
+              </a:ext>
+            </a:extLst>
+          </p:cNvPr>
+          <p:cNvSpPr/>
+          <p:nvPr/>
+        </p:nvSpPr>
+        <p:spPr>
+          <a:xfrm>
+            <a:off x="4332935" y="2625920"/>
+            <a:ext cx="772949" cy="795648"/>
+          </a:xfrm>
+          <a:prstGeom prst="roundRect">
+            <a:avLst>
+              <a:gd name="adj" fmla="val 0"/>
+            </a:avLst>
+          </a:prstGeom>
+          <a:solidFill>
+            <a:schemeClr val="accent3">
+              <a:lumMod val="20000"/>
+              <a:lumOff val="80000"/>
+            </a:schemeClr>
+          </a:solidFill>
+          <a:ln/>
+        </p:spPr>
+        <p:style>
+          <a:lnRef idx="2">
+            <a:schemeClr val="dk1"/>
+          </a:lnRef>
+          <a:fillRef idx="1">
+            <a:schemeClr val="lt1"/>
+          </a:fillRef>
+          <a:effectRef idx="0">
+            <a:schemeClr val="dk1"/>
+          </a:effectRef>
+          <a:fontRef idx="minor">
+            <a:schemeClr val="dk1"/>
+          </a:fontRef>
+        </p:style>
+        <p:txBody>
+          <a:bodyPr rtlCol="0" anchor="ctr"/>
+          <a:lstStyle/>
+          <a:p>
+            <a:pPr marL="0" marR="0" lvl="0" indent="0" algn="ctr" defTabSz="914367" rtl="0" eaLnBrk="1" fontAlgn="auto" latinLnBrk="0" hangingPunct="1">
+              <a:lnSpc>
+                <a:spcPct val="100000"/>
+              </a:lnSpc>
+              <a:spcBef>
+                <a:spcPts val="0"/>
+              </a:spcBef>
+              <a:spcAft>
+                <a:spcPts val="0"/>
+              </a:spcAft>
+              <a:buClrTx/>
+              <a:buSzTx/>
+              <a:buFontTx/>
+              <a:buNone/>
+              <a:tabLst/>
+              <a:defRPr/>
+            </a:pPr>
+            <a:r>
+              <a:rPr kumimoji="0" lang="en-US" sz="1100" b="0" i="0" u="none" strike="noStrike" kern="1200" cap="none" spc="0" normalizeH="0" baseline="0" noProof="0">
+                <a:ln>
+                  <a:noFill/>
+                </a:ln>
+                <a:solidFill>
+                  <a:srgbClr val="000000"/>
+                </a:solidFill>
+                <a:effectLst/>
+                <a:uLnTx/>
+                <a:uFillTx/>
+                <a:latin typeface="Segoe UI Semibold" panose="020B0702040204020203" pitchFamily="34" charset="0"/>
+                <a:ea typeface="+mn-ea"/>
+                <a:cs typeface="Segoe UI Semibold" panose="020B0702040204020203" pitchFamily="34" charset="0"/>
+              </a:rPr>
+              <a:t>PROXY SIDECAR</a:t>
+            </a:r>
+          </a:p>
+        </p:txBody>
+      </p:sp>
     </p:spTree>
     <p:extLst>
       <p:ext uri="{BB962C8B-B14F-4D97-AF65-F5344CB8AC3E}">

</xml_diff>

<commit_message>
Threat model and architecture to include auditor for endorsing the service for clients + signing process in the TCB
</commit_message>
<xml_diff>
--- a/inference/docs/images/diagrams.pptx
+++ b/inference/docs/images/diagrams.pptx
@@ -263,7 +263,7 @@
           <a:p>
             <a:fld id="{0ABD564D-309D-4998-9096-446EF35F8F13}" type="datetimeFigureOut">
               <a:rPr lang="en-GB" smtClean="0"/>
-              <a:t>20/02/2023</a:t>
+              <a:t>21/02/2023</a:t>
             </a:fld>
             <a:endParaRPr lang="en-GB"/>
           </a:p>
@@ -463,7 +463,7 @@
           <a:p>
             <a:fld id="{0ABD564D-309D-4998-9096-446EF35F8F13}" type="datetimeFigureOut">
               <a:rPr lang="en-GB" smtClean="0"/>
-              <a:t>20/02/2023</a:t>
+              <a:t>21/02/2023</a:t>
             </a:fld>
             <a:endParaRPr lang="en-GB"/>
           </a:p>
@@ -673,7 +673,7 @@
           <a:p>
             <a:fld id="{0ABD564D-309D-4998-9096-446EF35F8F13}" type="datetimeFigureOut">
               <a:rPr lang="en-GB" smtClean="0"/>
-              <a:t>20/02/2023</a:t>
+              <a:t>21/02/2023</a:t>
             </a:fld>
             <a:endParaRPr lang="en-GB"/>
           </a:p>
@@ -873,7 +873,7 @@
           <a:p>
             <a:fld id="{0ABD564D-309D-4998-9096-446EF35F8F13}" type="datetimeFigureOut">
               <a:rPr lang="en-GB" smtClean="0"/>
-              <a:t>20/02/2023</a:t>
+              <a:t>21/02/2023</a:t>
             </a:fld>
             <a:endParaRPr lang="en-GB"/>
           </a:p>
@@ -1149,7 +1149,7 @@
           <a:p>
             <a:fld id="{0ABD564D-309D-4998-9096-446EF35F8F13}" type="datetimeFigureOut">
               <a:rPr lang="en-GB" smtClean="0"/>
-              <a:t>20/02/2023</a:t>
+              <a:t>21/02/2023</a:t>
             </a:fld>
             <a:endParaRPr lang="en-GB"/>
           </a:p>
@@ -1417,7 +1417,7 @@
           <a:p>
             <a:fld id="{0ABD564D-309D-4998-9096-446EF35F8F13}" type="datetimeFigureOut">
               <a:rPr lang="en-GB" smtClean="0"/>
-              <a:t>20/02/2023</a:t>
+              <a:t>21/02/2023</a:t>
             </a:fld>
             <a:endParaRPr lang="en-GB"/>
           </a:p>
@@ -1832,7 +1832,7 @@
           <a:p>
             <a:fld id="{0ABD564D-309D-4998-9096-446EF35F8F13}" type="datetimeFigureOut">
               <a:rPr lang="en-GB" smtClean="0"/>
-              <a:t>20/02/2023</a:t>
+              <a:t>21/02/2023</a:t>
             </a:fld>
             <a:endParaRPr lang="en-GB"/>
           </a:p>
@@ -1974,7 +1974,7 @@
           <a:p>
             <a:fld id="{0ABD564D-309D-4998-9096-446EF35F8F13}" type="datetimeFigureOut">
               <a:rPr lang="en-GB" smtClean="0"/>
-              <a:t>20/02/2023</a:t>
+              <a:t>21/02/2023</a:t>
             </a:fld>
             <a:endParaRPr lang="en-GB"/>
           </a:p>
@@ -2087,7 +2087,7 @@
           <a:p>
             <a:fld id="{0ABD564D-309D-4998-9096-446EF35F8F13}" type="datetimeFigureOut">
               <a:rPr lang="en-GB" smtClean="0"/>
-              <a:t>20/02/2023</a:t>
+              <a:t>21/02/2023</a:t>
             </a:fld>
             <a:endParaRPr lang="en-GB"/>
           </a:p>
@@ -2400,7 +2400,7 @@
           <a:p>
             <a:fld id="{0ABD564D-309D-4998-9096-446EF35F8F13}" type="datetimeFigureOut">
               <a:rPr lang="en-GB" smtClean="0"/>
-              <a:t>20/02/2023</a:t>
+              <a:t>21/02/2023</a:t>
             </a:fld>
             <a:endParaRPr lang="en-GB"/>
           </a:p>
@@ -2689,7 +2689,7 @@
           <a:p>
             <a:fld id="{0ABD564D-309D-4998-9096-446EF35F8F13}" type="datetimeFigureOut">
               <a:rPr lang="en-GB" smtClean="0"/>
-              <a:t>20/02/2023</a:t>
+              <a:t>21/02/2023</a:t>
             </a:fld>
             <a:endParaRPr lang="en-GB"/>
           </a:p>
@@ -2932,7 +2932,7 @@
           <a:p>
             <a:fld id="{0ABD564D-309D-4998-9096-446EF35F8F13}" type="datetimeFigureOut">
               <a:rPr lang="en-GB" smtClean="0"/>
-              <a:t>20/02/2023</a:t>
+              <a:t>21/02/2023</a:t>
             </a:fld>
             <a:endParaRPr lang="en-GB"/>
           </a:p>
@@ -5093,7 +5093,7 @@
         </p:nvSpPr>
         <p:spPr>
           <a:xfrm>
-            <a:off x="766763" y="681038"/>
+            <a:off x="692768" y="607826"/>
             <a:ext cx="8896350" cy="5097711"/>
           </a:xfrm>
           <a:prstGeom prst="rect">
@@ -6197,7 +6197,7 @@
         </p:blipFill>
         <p:spPr>
           <a:xfrm>
-            <a:off x="5879556" y="622051"/>
+            <a:off x="5879556" y="884903"/>
             <a:ext cx="914400" cy="914400"/>
           </a:xfrm>
           <a:prstGeom prst="rect">
@@ -6219,7 +6219,7 @@
         </p:nvSpPr>
         <p:spPr>
           <a:xfrm>
-            <a:off x="5906574" y="1373895"/>
+            <a:off x="5906574" y="1636747"/>
             <a:ext cx="888961" cy="584775"/>
           </a:xfrm>
           <a:prstGeom prst="rect">
@@ -6279,7 +6279,7 @@
         </p:blipFill>
         <p:spPr>
           <a:xfrm>
-            <a:off x="2281010" y="622051"/>
+            <a:off x="2281010" y="884903"/>
             <a:ext cx="914400" cy="914400"/>
           </a:xfrm>
           <a:prstGeom prst="rect">
@@ -6301,7 +6301,7 @@
         </p:nvSpPr>
         <p:spPr>
           <a:xfrm>
-            <a:off x="2427180" y="1468863"/>
+            <a:off x="2427180" y="1731715"/>
             <a:ext cx="663643" cy="338554"/>
           </a:xfrm>
           <a:prstGeom prst="rect">
@@ -6333,18 +6333,20 @@
           </p:cNvPr>
           <p:cNvCxnSpPr>
             <a:cxnSpLocks/>
-            <a:stCxn id="20" idx="3"/>
+            <a:stCxn id="20" idx="0"/>
             <a:endCxn id="6" idx="0"/>
           </p:cNvCxnSpPr>
           <p:nvPr/>
         </p:nvCxnSpPr>
         <p:spPr>
-          <a:xfrm>
-            <a:off x="6793956" y="1079251"/>
-            <a:ext cx="1047428" cy="1203309"/>
-          </a:xfrm>
-          <a:prstGeom prst="bentConnector2">
-            <a:avLst/>
+          <a:xfrm rot="16200000" flipH="1">
+            <a:off x="6390241" y="831417"/>
+            <a:ext cx="1397657" cy="1504628"/>
+          </a:xfrm>
+          <a:prstGeom prst="bentConnector3">
+            <a:avLst>
+              <a:gd name="adj1" fmla="val -16356"/>
+            </a:avLst>
           </a:prstGeom>
           <a:ln>
             <a:tailEnd type="triangle"/>
@@ -6376,18 +6378,20 @@
           </p:cNvPr>
           <p:cNvCxnSpPr>
             <a:cxnSpLocks/>
-            <a:stCxn id="20" idx="3"/>
+            <a:stCxn id="20" idx="0"/>
             <a:endCxn id="7" idx="0"/>
           </p:cNvCxnSpPr>
           <p:nvPr/>
         </p:nvCxnSpPr>
         <p:spPr>
-          <a:xfrm>
-            <a:off x="6793956" y="1079251"/>
-            <a:ext cx="2038874" cy="1203310"/>
-          </a:xfrm>
-          <a:prstGeom prst="bentConnector2">
-            <a:avLst/>
+          <a:xfrm rot="16200000" flipH="1">
+            <a:off x="6885964" y="335695"/>
+            <a:ext cx="1397658" cy="2496074"/>
+          </a:xfrm>
+          <a:prstGeom prst="bentConnector3">
+            <a:avLst>
+              <a:gd name="adj1" fmla="val -16356"/>
+            </a:avLst>
           </a:prstGeom>
           <a:ln>
             <a:tailEnd type="triangle"/>
@@ -6543,12 +6547,12 @@
         </p:nvCxnSpPr>
         <p:spPr>
           <a:xfrm rot="10800000" flipV="1">
-            <a:off x="1289500" y="1079250"/>
-            <a:ext cx="991511" cy="1944493"/>
+            <a:off x="1289500" y="1342102"/>
+            <a:ext cx="991511" cy="1681641"/>
           </a:xfrm>
           <a:prstGeom prst="bentConnector3">
             <a:avLst>
-              <a:gd name="adj1" fmla="val 139387"/>
+              <a:gd name="adj1" fmla="val 139280"/>
             </a:avLst>
           </a:prstGeom>
           <a:ln>
@@ -6755,8 +6759,8 @@
         </p:nvCxnSpPr>
         <p:spPr>
           <a:xfrm flipV="1">
-            <a:off x="3829576" y="681038"/>
-            <a:ext cx="0" cy="4953000"/>
+            <a:off x="3829576" y="1892948"/>
+            <a:ext cx="0" cy="3741090"/>
           </a:xfrm>
           <a:prstGeom prst="line">
             <a:avLst/>
@@ -7234,7 +7238,7 @@
         </p:blipFill>
         <p:spPr bwMode="auto">
           <a:xfrm>
-            <a:off x="1920556" y="1142578"/>
+            <a:off x="1920556" y="1415548"/>
             <a:ext cx="289107" cy="305991"/>
           </a:xfrm>
           <a:prstGeom prst="rect">
@@ -7518,49 +7522,6 @@
           </a:prstGeom>
         </p:spPr>
       </p:pic>
-      <p:cxnSp>
-        <p:nvCxnSpPr>
-          <p:cNvPr id="58" name="Connector: Elbow 57">
-            <a:extLst>
-              <a:ext uri="{FF2B5EF4-FFF2-40B4-BE49-F238E27FC236}">
-                <a16:creationId xmlns:a16="http://schemas.microsoft.com/office/drawing/2014/main" id="{76898D46-8C29-7912-423F-1EF8AE9EEFE3}"/>
-              </a:ext>
-            </a:extLst>
-          </p:cNvPr>
-          <p:cNvCxnSpPr>
-            <a:cxnSpLocks/>
-            <a:endCxn id="5" idx="1"/>
-          </p:cNvCxnSpPr>
-          <p:nvPr/>
-        </p:nvCxnSpPr>
-        <p:spPr>
-          <a:xfrm rot="16200000" flipH="1">
-            <a:off x="4471379" y="4193260"/>
-            <a:ext cx="811744" cy="312361"/>
-          </a:xfrm>
-          <a:prstGeom prst="bentConnector2">
-            <a:avLst/>
-          </a:prstGeom>
-          <a:ln>
-            <a:headEnd type="triangle" w="med" len="med"/>
-            <a:tailEnd type="triangle" w="med" len="med"/>
-          </a:ln>
-        </p:spPr>
-        <p:style>
-          <a:lnRef idx="1">
-            <a:schemeClr val="dk1"/>
-          </a:lnRef>
-          <a:fillRef idx="0">
-            <a:schemeClr val="dk1"/>
-          </a:fillRef>
-          <a:effectRef idx="0">
-            <a:schemeClr val="dk1"/>
-          </a:effectRef>
-          <a:fontRef idx="minor">
-            <a:schemeClr val="tx1"/>
-          </a:fontRef>
-        </p:style>
-      </p:cxnSp>
       <p:cxnSp>
         <p:nvCxnSpPr>
           <p:cNvPr id="70" name="Straight Connector 69">
@@ -7600,10 +7561,225 @@
       </p:cxnSp>
       <p:sp>
         <p:nvSpPr>
-          <p:cNvPr id="71" name="Rectangle: Rounded Corners 70">
-            <a:extLst>
-              <a:ext uri="{FF2B5EF4-FFF2-40B4-BE49-F238E27FC236}">
-                <a16:creationId xmlns:a16="http://schemas.microsoft.com/office/drawing/2014/main" id="{D9E6FA02-B138-CFFB-E83F-FA8D2E1E4EC4}"/>
+          <p:cNvPr id="72" name="Rectangle: Rounded Corners 71">
+            <a:extLst>
+              <a:ext uri="{FF2B5EF4-FFF2-40B4-BE49-F238E27FC236}">
+                <a16:creationId xmlns:a16="http://schemas.microsoft.com/office/drawing/2014/main" id="{2CA35F0D-FA3E-AC2F-774B-1652050BA92A}"/>
+              </a:ext>
+            </a:extLst>
+          </p:cNvPr>
+          <p:cNvSpPr/>
+          <p:nvPr/>
+        </p:nvSpPr>
+        <p:spPr>
+          <a:xfrm>
+            <a:off x="4332935" y="2625920"/>
+            <a:ext cx="772949" cy="795648"/>
+          </a:xfrm>
+          <a:prstGeom prst="roundRect">
+            <a:avLst>
+              <a:gd name="adj" fmla="val 0"/>
+            </a:avLst>
+          </a:prstGeom>
+          <a:solidFill>
+            <a:schemeClr val="accent3">
+              <a:lumMod val="20000"/>
+              <a:lumOff val="80000"/>
+            </a:schemeClr>
+          </a:solidFill>
+          <a:ln/>
+        </p:spPr>
+        <p:style>
+          <a:lnRef idx="2">
+            <a:schemeClr val="dk1"/>
+          </a:lnRef>
+          <a:fillRef idx="1">
+            <a:schemeClr val="lt1"/>
+          </a:fillRef>
+          <a:effectRef idx="0">
+            <a:schemeClr val="dk1"/>
+          </a:effectRef>
+          <a:fontRef idx="minor">
+            <a:schemeClr val="dk1"/>
+          </a:fontRef>
+        </p:style>
+        <p:txBody>
+          <a:bodyPr rtlCol="0" anchor="ctr"/>
+          <a:lstStyle/>
+          <a:p>
+            <a:pPr marL="0" marR="0" lvl="0" indent="0" algn="ctr" defTabSz="914367" rtl="0" eaLnBrk="1" fontAlgn="auto" latinLnBrk="0" hangingPunct="1">
+              <a:lnSpc>
+                <a:spcPct val="100000"/>
+              </a:lnSpc>
+              <a:spcBef>
+                <a:spcPts val="0"/>
+              </a:spcBef>
+              <a:spcAft>
+                <a:spcPts val="0"/>
+              </a:spcAft>
+              <a:buClrTx/>
+              <a:buSzTx/>
+              <a:buFontTx/>
+              <a:buNone/>
+              <a:tabLst/>
+              <a:defRPr/>
+            </a:pPr>
+            <a:r>
+              <a:rPr kumimoji="0" lang="en-US" sz="1100" b="0" i="0" u="none" strike="noStrike" kern="1200" cap="none" spc="0" normalizeH="0" baseline="0" noProof="0">
+                <a:ln>
+                  <a:noFill/>
+                </a:ln>
+                <a:solidFill>
+                  <a:srgbClr val="000000"/>
+                </a:solidFill>
+                <a:effectLst/>
+                <a:uLnTx/>
+                <a:uFillTx/>
+                <a:latin typeface="Segoe UI Semibold" panose="020B0702040204020203" pitchFamily="34" charset="0"/>
+                <a:ea typeface="+mn-ea"/>
+                <a:cs typeface="Segoe UI Semibold" panose="020B0702040204020203" pitchFamily="34" charset="0"/>
+              </a:rPr>
+              <a:t>PROXY SIDECAR</a:t>
+            </a:r>
+          </a:p>
+        </p:txBody>
+      </p:sp>
+      <p:sp>
+        <p:nvSpPr>
+          <p:cNvPr id="11" name="Rectangle: Rounded Corners 10">
+            <a:extLst>
+              <a:ext uri="{FF2B5EF4-FFF2-40B4-BE49-F238E27FC236}">
+                <a16:creationId xmlns:a16="http://schemas.microsoft.com/office/drawing/2014/main" id="{A65850D2-7991-72C2-F038-AB0247E8C6EA}"/>
+              </a:ext>
+            </a:extLst>
+          </p:cNvPr>
+          <p:cNvSpPr/>
+          <p:nvPr/>
+        </p:nvSpPr>
+        <p:spPr>
+          <a:xfrm>
+            <a:off x="4351279" y="4457145"/>
+            <a:ext cx="523337" cy="596336"/>
+          </a:xfrm>
+          <a:prstGeom prst="roundRect">
+            <a:avLst>
+              <a:gd name="adj" fmla="val 3176"/>
+            </a:avLst>
+          </a:prstGeom>
+          <a:solidFill>
+            <a:schemeClr val="accent6">
+              <a:lumMod val="20000"/>
+              <a:lumOff val="80000"/>
+            </a:schemeClr>
+          </a:solidFill>
+          <a:ln/>
+        </p:spPr>
+        <p:style>
+          <a:lnRef idx="2">
+            <a:schemeClr val="dk1"/>
+          </a:lnRef>
+          <a:fillRef idx="1">
+            <a:schemeClr val="lt1"/>
+          </a:fillRef>
+          <a:effectRef idx="0">
+            <a:schemeClr val="dk1"/>
+          </a:effectRef>
+          <a:fontRef idx="minor">
+            <a:schemeClr val="dk1"/>
+          </a:fontRef>
+        </p:style>
+        <p:txBody>
+          <a:bodyPr rtlCol="0" anchor="ctr"/>
+          <a:lstStyle/>
+          <a:p>
+            <a:pPr marL="0" marR="0" lvl="0" indent="0" algn="ctr" defTabSz="914367" rtl="0" eaLnBrk="1" fontAlgn="auto" latinLnBrk="0" hangingPunct="1">
+              <a:lnSpc>
+                <a:spcPct val="100000"/>
+              </a:lnSpc>
+              <a:spcBef>
+                <a:spcPts val="0"/>
+              </a:spcBef>
+              <a:spcAft>
+                <a:spcPts val="0"/>
+              </a:spcAft>
+              <a:buClrTx/>
+              <a:buSzTx/>
+              <a:buFontTx/>
+              <a:buNone/>
+              <a:tabLst/>
+              <a:defRPr/>
+            </a:pPr>
+            <a:r>
+              <a:rPr kumimoji="0" lang="en-US" sz="1100" b="0" i="0" u="none" strike="noStrike" kern="1200" cap="none" spc="0" normalizeH="0" baseline="0" noProof="0" dirty="0">
+                <a:ln>
+                  <a:noFill/>
+                </a:ln>
+                <a:solidFill>
+                  <a:srgbClr val="000000"/>
+                </a:solidFill>
+                <a:effectLst/>
+                <a:uLnTx/>
+                <a:uFillTx/>
+                <a:latin typeface="Segoe UI Semibold" panose="020B0702040204020203" pitchFamily="34" charset="0"/>
+                <a:ea typeface="+mn-ea"/>
+                <a:cs typeface="Segoe UI Semibold" panose="020B0702040204020203" pitchFamily="34" charset="0"/>
+              </a:rPr>
+              <a:t>MAA</a:t>
+            </a:r>
+          </a:p>
+        </p:txBody>
+      </p:sp>
+      <p:cxnSp>
+        <p:nvCxnSpPr>
+          <p:cNvPr id="19" name="Connector: Elbow 18">
+            <a:extLst>
+              <a:ext uri="{FF2B5EF4-FFF2-40B4-BE49-F238E27FC236}">
+                <a16:creationId xmlns:a16="http://schemas.microsoft.com/office/drawing/2014/main" id="{A947C0A1-C320-78C9-BBB7-0F3CAF044B4E}"/>
+              </a:ext>
+            </a:extLst>
+          </p:cNvPr>
+          <p:cNvCxnSpPr>
+            <a:cxnSpLocks/>
+            <a:endCxn id="11" idx="0"/>
+          </p:cNvCxnSpPr>
+          <p:nvPr/>
+        </p:nvCxnSpPr>
+        <p:spPr>
+          <a:xfrm rot="16200000" flipH="1">
+            <a:off x="4338886" y="4183083"/>
+            <a:ext cx="548122" cy="1"/>
+          </a:xfrm>
+          <a:prstGeom prst="bentConnector3">
+            <a:avLst/>
+          </a:prstGeom>
+          <a:ln>
+            <a:solidFill>
+              <a:schemeClr val="tx1"/>
+            </a:solidFill>
+            <a:tailEnd type="triangle"/>
+          </a:ln>
+        </p:spPr>
+        <p:style>
+          <a:lnRef idx="1">
+            <a:schemeClr val="accent1"/>
+          </a:lnRef>
+          <a:fillRef idx="0">
+            <a:schemeClr val="accent1"/>
+          </a:fillRef>
+          <a:effectRef idx="0">
+            <a:schemeClr val="accent1"/>
+          </a:effectRef>
+          <a:fontRef idx="minor">
+            <a:schemeClr val="tx1"/>
+          </a:fontRef>
+        </p:style>
+      </p:cxnSp>
+      <p:sp>
+        <p:nvSpPr>
+          <p:cNvPr id="31" name="Rectangle: Rounded Corners 30">
+            <a:extLst>
+              <a:ext uri="{FF2B5EF4-FFF2-40B4-BE49-F238E27FC236}">
+                <a16:creationId xmlns:a16="http://schemas.microsoft.com/office/drawing/2014/main" id="{9BBBBA4D-FCAD-E902-98DC-5F1F57D1FA1C}"/>
               </a:ext>
             </a:extLst>
           </p:cNvPr>
@@ -7716,91 +7892,129 @@
           </a:p>
         </p:txBody>
       </p:sp>
-      <p:sp>
-        <p:nvSpPr>
-          <p:cNvPr id="72" name="Rectangle: Rounded Corners 71">
-            <a:extLst>
-              <a:ext uri="{FF2B5EF4-FFF2-40B4-BE49-F238E27FC236}">
-                <a16:creationId xmlns:a16="http://schemas.microsoft.com/office/drawing/2014/main" id="{2CA35F0D-FA3E-AC2F-774B-1652050BA92A}"/>
-              </a:ext>
-            </a:extLst>
-          </p:cNvPr>
-          <p:cNvSpPr/>
+      <p:pic>
+        <p:nvPicPr>
+          <p:cNvPr id="43" name="Graphic 42" descr="User with solid fill">
+            <a:extLst>
+              <a:ext uri="{FF2B5EF4-FFF2-40B4-BE49-F238E27FC236}">
+                <a16:creationId xmlns:a16="http://schemas.microsoft.com/office/drawing/2014/main" id="{ADB09EAD-8352-FA51-BEEF-ADF076678F36}"/>
+              </a:ext>
+            </a:extLst>
+          </p:cNvPr>
+          <p:cNvPicPr>
+            <a:picLocks noChangeAspect="1"/>
+          </p:cNvPicPr>
           <p:nvPr/>
-        </p:nvSpPr>
+        </p:nvPicPr>
+        <p:blipFill>
+          <a:blip r:embed="rId2">
+            <a:extLst>
+              <a:ext uri="{28A0092B-C50C-407E-A947-70E740481C1C}">
+                <a14:useLocalDpi xmlns:a14="http://schemas.microsoft.com/office/drawing/2010/main" val="0"/>
+              </a:ext>
+              <a:ext uri="{96DAC541-7B7A-43D3-8B79-37D633B846F1}">
+                <asvg:svgBlip xmlns:asvg="http://schemas.microsoft.com/office/drawing/2016/SVG/main" r:embed="rId3"/>
+              </a:ext>
+            </a:extLst>
+          </a:blip>
+          <a:stretch>
+            <a:fillRect/>
+          </a:stretch>
+        </p:blipFill>
         <p:spPr>
           <a:xfrm>
-            <a:off x="4332935" y="2625920"/>
-            <a:ext cx="772949" cy="795648"/>
-          </a:xfrm>
-          <a:prstGeom prst="roundRect">
+            <a:off x="4323909" y="867718"/>
+            <a:ext cx="914400" cy="914400"/>
+          </a:xfrm>
+          <a:prstGeom prst="rect">
+            <a:avLst/>
+          </a:prstGeom>
+        </p:spPr>
+      </p:pic>
+      <p:sp>
+        <p:nvSpPr>
+          <p:cNvPr id="46" name="TextBox 45">
+            <a:extLst>
+              <a:ext uri="{FF2B5EF4-FFF2-40B4-BE49-F238E27FC236}">
+                <a16:creationId xmlns:a16="http://schemas.microsoft.com/office/drawing/2014/main" id="{19CFE374-73BA-D2D7-1BF6-249B16D76AA7}"/>
+              </a:ext>
+            </a:extLst>
+          </p:cNvPr>
+          <p:cNvSpPr txBox="1"/>
+          <p:nvPr/>
+        </p:nvSpPr>
+        <p:spPr>
+          <a:xfrm>
+            <a:off x="4470079" y="1714530"/>
+            <a:ext cx="812658" cy="338554"/>
+          </a:xfrm>
+          <a:prstGeom prst="rect">
+            <a:avLst/>
+          </a:prstGeom>
+          <a:noFill/>
+        </p:spPr>
+        <p:txBody>
+          <a:bodyPr wrap="none" rtlCol="0">
+            <a:spAutoFit/>
+          </a:bodyPr>
+          <a:lstStyle/>
+          <a:p>
+            <a:r>
+              <a:rPr lang="en-GB" sz="1600" dirty="0"/>
+              <a:t>Auditor</a:t>
+            </a:r>
+          </a:p>
+        </p:txBody>
+      </p:sp>
+      <p:cxnSp>
+        <p:nvCxnSpPr>
+          <p:cNvPr id="48" name="Connector: Elbow 47">
+            <a:extLst>
+              <a:ext uri="{FF2B5EF4-FFF2-40B4-BE49-F238E27FC236}">
+                <a16:creationId xmlns:a16="http://schemas.microsoft.com/office/drawing/2014/main" id="{EB9B3ED9-3DC5-E093-DB94-5090D455728A}"/>
+              </a:ext>
+            </a:extLst>
+          </p:cNvPr>
+          <p:cNvCxnSpPr>
+            <a:cxnSpLocks/>
+            <a:stCxn id="43" idx="0"/>
+            <a:endCxn id="11" idx="1"/>
+          </p:cNvCxnSpPr>
+          <p:nvPr/>
+        </p:nvCxnSpPr>
+        <p:spPr>
+          <a:xfrm rot="16200000" flipH="1" flipV="1">
+            <a:off x="2622396" y="2596600"/>
+            <a:ext cx="3887595" cy="429830"/>
+          </a:xfrm>
+          <a:prstGeom prst="bentConnector4">
             <a:avLst>
-              <a:gd name="adj" fmla="val 0"/>
+              <a:gd name="adj1" fmla="val -5880"/>
+              <a:gd name="adj2" fmla="val 943520"/>
             </a:avLst>
           </a:prstGeom>
-          <a:solidFill>
-            <a:schemeClr val="accent3">
-              <a:lumMod val="20000"/>
-              <a:lumOff val="80000"/>
-            </a:schemeClr>
-          </a:solidFill>
-          <a:ln/>
+          <a:ln>
+            <a:solidFill>
+              <a:schemeClr val="tx1"/>
+            </a:solidFill>
+            <a:tailEnd type="triangle"/>
+          </a:ln>
         </p:spPr>
         <p:style>
-          <a:lnRef idx="2">
-            <a:schemeClr val="dk1"/>
+          <a:lnRef idx="1">
+            <a:schemeClr val="accent1"/>
           </a:lnRef>
-          <a:fillRef idx="1">
-            <a:schemeClr val="lt1"/>
+          <a:fillRef idx="0">
+            <a:schemeClr val="accent1"/>
           </a:fillRef>
           <a:effectRef idx="0">
-            <a:schemeClr val="dk1"/>
+            <a:schemeClr val="accent1"/>
           </a:effectRef>
           <a:fontRef idx="minor">
-            <a:schemeClr val="dk1"/>
+            <a:schemeClr val="tx1"/>
           </a:fontRef>
         </p:style>
-        <p:txBody>
-          <a:bodyPr rtlCol="0" anchor="ctr"/>
-          <a:lstStyle/>
-          <a:p>
-            <a:pPr marL="0" marR="0" lvl="0" indent="0" algn="ctr" defTabSz="914367" rtl="0" eaLnBrk="1" fontAlgn="auto" latinLnBrk="0" hangingPunct="1">
-              <a:lnSpc>
-                <a:spcPct val="100000"/>
-              </a:lnSpc>
-              <a:spcBef>
-                <a:spcPts val="0"/>
-              </a:spcBef>
-              <a:spcAft>
-                <a:spcPts val="0"/>
-              </a:spcAft>
-              <a:buClrTx/>
-              <a:buSzTx/>
-              <a:buFontTx/>
-              <a:buNone/>
-              <a:tabLst/>
-              <a:defRPr/>
-            </a:pPr>
-            <a:r>
-              <a:rPr kumimoji="0" lang="en-US" sz="1100" b="0" i="0" u="none" strike="noStrike" kern="1200" cap="none" spc="0" normalizeH="0" baseline="0" noProof="0">
-                <a:ln>
-                  <a:noFill/>
-                </a:ln>
-                <a:solidFill>
-                  <a:srgbClr val="000000"/>
-                </a:solidFill>
-                <a:effectLst/>
-                <a:uLnTx/>
-                <a:uFillTx/>
-                <a:latin typeface="Segoe UI Semibold" panose="020B0702040204020203" pitchFamily="34" charset="0"/>
-                <a:ea typeface="+mn-ea"/>
-                <a:cs typeface="Segoe UI Semibold" panose="020B0702040204020203" pitchFamily="34" charset="0"/>
-              </a:rPr>
-              <a:t>PROXY SIDECAR</a:t>
-            </a:r>
-          </a:p>
-        </p:txBody>
-      </p:sp>
+      </p:cxnSp>
     </p:spTree>
     <p:extLst>
       <p:ext uri="{BB962C8B-B14F-4D97-AF65-F5344CB8AC3E}">

</xml_diff>

<commit_message>
Updated arch to use only one MAA instance
</commit_message>
<xml_diff>
--- a/inference/docs/images/diagrams.pptx
+++ b/inference/docs/images/diagrams.pptx
@@ -263,7 +263,7 @@
           <a:p>
             <a:fld id="{0ABD564D-309D-4998-9096-446EF35F8F13}" type="datetimeFigureOut">
               <a:rPr lang="en-GB" smtClean="0"/>
-              <a:t>21/02/2023</a:t>
+              <a:t>23/02/2023</a:t>
             </a:fld>
             <a:endParaRPr lang="en-GB"/>
           </a:p>
@@ -463,7 +463,7 @@
           <a:p>
             <a:fld id="{0ABD564D-309D-4998-9096-446EF35F8F13}" type="datetimeFigureOut">
               <a:rPr lang="en-GB" smtClean="0"/>
-              <a:t>21/02/2023</a:t>
+              <a:t>23/02/2023</a:t>
             </a:fld>
             <a:endParaRPr lang="en-GB"/>
           </a:p>
@@ -673,7 +673,7 @@
           <a:p>
             <a:fld id="{0ABD564D-309D-4998-9096-446EF35F8F13}" type="datetimeFigureOut">
               <a:rPr lang="en-GB" smtClean="0"/>
-              <a:t>21/02/2023</a:t>
+              <a:t>23/02/2023</a:t>
             </a:fld>
             <a:endParaRPr lang="en-GB"/>
           </a:p>
@@ -873,7 +873,7 @@
           <a:p>
             <a:fld id="{0ABD564D-309D-4998-9096-446EF35F8F13}" type="datetimeFigureOut">
               <a:rPr lang="en-GB" smtClean="0"/>
-              <a:t>21/02/2023</a:t>
+              <a:t>23/02/2023</a:t>
             </a:fld>
             <a:endParaRPr lang="en-GB"/>
           </a:p>
@@ -1149,7 +1149,7 @@
           <a:p>
             <a:fld id="{0ABD564D-309D-4998-9096-446EF35F8F13}" type="datetimeFigureOut">
               <a:rPr lang="en-GB" smtClean="0"/>
-              <a:t>21/02/2023</a:t>
+              <a:t>23/02/2023</a:t>
             </a:fld>
             <a:endParaRPr lang="en-GB"/>
           </a:p>
@@ -1417,7 +1417,7 @@
           <a:p>
             <a:fld id="{0ABD564D-309D-4998-9096-446EF35F8F13}" type="datetimeFigureOut">
               <a:rPr lang="en-GB" smtClean="0"/>
-              <a:t>21/02/2023</a:t>
+              <a:t>23/02/2023</a:t>
             </a:fld>
             <a:endParaRPr lang="en-GB"/>
           </a:p>
@@ -1832,7 +1832,7 @@
           <a:p>
             <a:fld id="{0ABD564D-309D-4998-9096-446EF35F8F13}" type="datetimeFigureOut">
               <a:rPr lang="en-GB" smtClean="0"/>
-              <a:t>21/02/2023</a:t>
+              <a:t>23/02/2023</a:t>
             </a:fld>
             <a:endParaRPr lang="en-GB"/>
           </a:p>
@@ -1974,7 +1974,7 @@
           <a:p>
             <a:fld id="{0ABD564D-309D-4998-9096-446EF35F8F13}" type="datetimeFigureOut">
               <a:rPr lang="en-GB" smtClean="0"/>
-              <a:t>21/02/2023</a:t>
+              <a:t>23/02/2023</a:t>
             </a:fld>
             <a:endParaRPr lang="en-GB"/>
           </a:p>
@@ -2087,7 +2087,7 @@
           <a:p>
             <a:fld id="{0ABD564D-309D-4998-9096-446EF35F8F13}" type="datetimeFigureOut">
               <a:rPr lang="en-GB" smtClean="0"/>
-              <a:t>21/02/2023</a:t>
+              <a:t>23/02/2023</a:t>
             </a:fld>
             <a:endParaRPr lang="en-GB"/>
           </a:p>
@@ -2400,7 +2400,7 @@
           <a:p>
             <a:fld id="{0ABD564D-309D-4998-9096-446EF35F8F13}" type="datetimeFigureOut">
               <a:rPr lang="en-GB" smtClean="0"/>
-              <a:t>21/02/2023</a:t>
+              <a:t>23/02/2023</a:t>
             </a:fld>
             <a:endParaRPr lang="en-GB"/>
           </a:p>
@@ -2689,7 +2689,7 @@
           <a:p>
             <a:fld id="{0ABD564D-309D-4998-9096-446EF35F8F13}" type="datetimeFigureOut">
               <a:rPr lang="en-GB" smtClean="0"/>
-              <a:t>21/02/2023</a:t>
+              <a:t>23/02/2023</a:t>
             </a:fld>
             <a:endParaRPr lang="en-GB"/>
           </a:p>
@@ -2932,7 +2932,7 @@
           <a:p>
             <a:fld id="{0ABD564D-309D-4998-9096-446EF35F8F13}" type="datetimeFigureOut">
               <a:rPr lang="en-GB" smtClean="0"/>
-              <a:t>21/02/2023</a:t>
+              <a:t>23/02/2023</a:t>
             </a:fld>
             <a:endParaRPr lang="en-GB"/>
           </a:p>
@@ -5315,7 +5315,7 @@
         </p:nvSpPr>
         <p:spPr>
           <a:xfrm>
-            <a:off x="5977025" y="4643787"/>
+            <a:off x="5673687" y="4643787"/>
             <a:ext cx="523337" cy="596336"/>
           </a:xfrm>
           <a:prstGeom prst="roundRect">
@@ -5574,8 +5574,8 @@
         </p:nvCxnSpPr>
         <p:spPr>
           <a:xfrm rot="5400000" flipH="1" flipV="1">
-            <a:off x="6076324" y="4101541"/>
-            <a:ext cx="704616" cy="379877"/>
+            <a:off x="5924655" y="3949872"/>
+            <a:ext cx="704616" cy="683215"/>
           </a:xfrm>
           <a:prstGeom prst="bentConnector3">
             <a:avLst>
@@ -6019,7 +6019,7 @@
         </p:nvSpPr>
         <p:spPr>
           <a:xfrm>
-            <a:off x="6600796" y="4643787"/>
+            <a:off x="6229248" y="4643787"/>
             <a:ext cx="793551" cy="596336"/>
           </a:xfrm>
           <a:prstGeom prst="roundRect">
@@ -6133,55 +6133,6 @@
           </a:p>
         </p:txBody>
       </p:sp>
-      <p:cxnSp>
-        <p:nvCxnSpPr>
-          <p:cNvPr id="18" name="Connector: Elbow 17">
-            <a:extLst>
-              <a:ext uri="{FF2B5EF4-FFF2-40B4-BE49-F238E27FC236}">
-                <a16:creationId xmlns:a16="http://schemas.microsoft.com/office/drawing/2014/main" id="{B1CE57A4-140E-7C80-3149-E5FDCECD2A62}"/>
-              </a:ext>
-            </a:extLst>
-          </p:cNvPr>
-          <p:cNvCxnSpPr>
-            <a:cxnSpLocks/>
-            <a:stCxn id="17" idx="0"/>
-            <a:endCxn id="13" idx="2"/>
-          </p:cNvCxnSpPr>
-          <p:nvPr/>
-        </p:nvCxnSpPr>
-        <p:spPr>
-          <a:xfrm rot="16200000" flipV="1">
-            <a:off x="6455764" y="4101978"/>
-            <a:ext cx="704616" cy="379001"/>
-          </a:xfrm>
-          <a:prstGeom prst="bentConnector3">
-            <a:avLst>
-              <a:gd name="adj1" fmla="val 50000"/>
-            </a:avLst>
-          </a:prstGeom>
-          <a:ln>
-            <a:solidFill>
-              <a:schemeClr val="accent1"/>
-            </a:solidFill>
-            <a:headEnd type="triangle" w="med" len="med"/>
-            <a:tailEnd type="triangle" w="med" len="med"/>
-          </a:ln>
-        </p:spPr>
-        <p:style>
-          <a:lnRef idx="1">
-            <a:schemeClr val="dk1"/>
-          </a:lnRef>
-          <a:fillRef idx="0">
-            <a:schemeClr val="dk1"/>
-          </a:fillRef>
-          <a:effectRef idx="0">
-            <a:schemeClr val="dk1"/>
-          </a:effectRef>
-          <a:fontRef idx="minor">
-            <a:schemeClr val="tx1"/>
-          </a:fontRef>
-        </p:style>
-      </p:cxnSp>
       <p:pic>
         <p:nvPicPr>
           <p:cNvPr id="20" name="Graphic 19" descr="User with solid fill">
@@ -7521,91 +7472,6 @@
           </a:p>
         </p:txBody>
       </p:sp>
-      <p:sp>
-        <p:nvSpPr>
-          <p:cNvPr id="11" name="Rectangle: Rounded Corners 10">
-            <a:extLst>
-              <a:ext uri="{FF2B5EF4-FFF2-40B4-BE49-F238E27FC236}">
-                <a16:creationId xmlns:a16="http://schemas.microsoft.com/office/drawing/2014/main" id="{A65850D2-7991-72C2-F038-AB0247E8C6EA}"/>
-              </a:ext>
-            </a:extLst>
-          </p:cNvPr>
-          <p:cNvSpPr/>
-          <p:nvPr/>
-        </p:nvSpPr>
-        <p:spPr>
-          <a:xfrm>
-            <a:off x="5326176" y="4643787"/>
-            <a:ext cx="523337" cy="596336"/>
-          </a:xfrm>
-          <a:prstGeom prst="roundRect">
-            <a:avLst>
-              <a:gd name="adj" fmla="val 3176"/>
-            </a:avLst>
-          </a:prstGeom>
-          <a:solidFill>
-            <a:schemeClr val="accent6">
-              <a:lumMod val="20000"/>
-              <a:lumOff val="80000"/>
-            </a:schemeClr>
-          </a:solidFill>
-          <a:ln/>
-        </p:spPr>
-        <p:style>
-          <a:lnRef idx="2">
-            <a:schemeClr val="dk1"/>
-          </a:lnRef>
-          <a:fillRef idx="1">
-            <a:schemeClr val="lt1"/>
-          </a:fillRef>
-          <a:effectRef idx="0">
-            <a:schemeClr val="dk1"/>
-          </a:effectRef>
-          <a:fontRef idx="minor">
-            <a:schemeClr val="dk1"/>
-          </a:fontRef>
-        </p:style>
-        <p:txBody>
-          <a:bodyPr rtlCol="0" anchor="ctr"/>
-          <a:lstStyle/>
-          <a:p>
-            <a:pPr marL="0" marR="0" lvl="0" indent="0" algn="ctr" defTabSz="914367" rtl="0" eaLnBrk="1" fontAlgn="auto" latinLnBrk="0" hangingPunct="1">
-              <a:lnSpc>
-                <a:spcPct val="100000"/>
-              </a:lnSpc>
-              <a:spcBef>
-                <a:spcPts val="0"/>
-              </a:spcBef>
-              <a:spcAft>
-                <a:spcPts val="0"/>
-              </a:spcAft>
-              <a:buClrTx/>
-              <a:buSzTx/>
-              <a:buFontTx/>
-              <a:buNone/>
-              <a:tabLst/>
-              <a:defRPr/>
-            </a:pPr>
-            <a:r>
-              <a:rPr kumimoji="0" lang="en-US" sz="1100" b="0" i="0" u="none" strike="noStrike" kern="1200" cap="none" spc="0" normalizeH="0" baseline="0" noProof="0" dirty="0">
-                <a:ln>
-                  <a:noFill/>
-                </a:ln>
-                <a:solidFill>
-                  <a:srgbClr val="000000"/>
-                </a:solidFill>
-                <a:effectLst/>
-                <a:uLnTx/>
-                <a:uFillTx/>
-                <a:latin typeface="Segoe UI Semibold" panose="020B0702040204020203" pitchFamily="34" charset="0"/>
-                <a:ea typeface="+mn-ea"/>
-                <a:cs typeface="Segoe UI Semibold" panose="020B0702040204020203" pitchFamily="34" charset="0"/>
-              </a:rPr>
-              <a:t>MAA</a:t>
-            </a:r>
-          </a:p>
-        </p:txBody>
-      </p:sp>
       <p:cxnSp>
         <p:nvCxnSpPr>
           <p:cNvPr id="19" name="Connector: Elbow 18">
@@ -7618,16 +7484,16 @@
           <p:cNvCxnSpPr>
             <a:cxnSpLocks/>
             <a:stCxn id="31" idx="2"/>
-            <a:endCxn id="11" idx="0"/>
+            <a:endCxn id="5" idx="1"/>
           </p:cNvCxnSpPr>
           <p:nvPr/>
         </p:nvCxnSpPr>
         <p:spPr>
-          <a:xfrm rot="5400000">
-            <a:off x="5237737" y="4293678"/>
-            <a:ext cx="700218" cy="1"/>
-          </a:xfrm>
-          <a:prstGeom prst="bentConnector3">
+          <a:xfrm rot="16200000" flipH="1">
+            <a:off x="5131573" y="4399841"/>
+            <a:ext cx="998386" cy="85841"/>
+          </a:xfrm>
+          <a:prstGeom prst="bentConnector2">
             <a:avLst/>
           </a:prstGeom>
           <a:ln>
@@ -7700,7 +7566,7 @@
           <a:bodyPr rtlCol="0" anchor="ctr"/>
           <a:lstStyle/>
           <a:p>
-            <a:pPr marL="0" marR="0" lvl="0" indent="0" defTabSz="914367" rtl="0" eaLnBrk="1" fontAlgn="auto" latinLnBrk="0" hangingPunct="1">
+            <a:pPr marL="0" marR="0" lvl="0" indent="0" algn="ctr" defTabSz="914367" rtl="0" eaLnBrk="1" fontAlgn="auto" latinLnBrk="0" hangingPunct="1">
               <a:lnSpc>
                 <a:spcPct val="100000"/>
               </a:lnSpc>
@@ -7856,14 +7722,14 @@
           <p:cNvCxnSpPr>
             <a:cxnSpLocks/>
             <a:stCxn id="43" idx="1"/>
-            <a:endCxn id="11" idx="2"/>
+            <a:endCxn id="5" idx="2"/>
           </p:cNvCxnSpPr>
           <p:nvPr/>
         </p:nvCxnSpPr>
         <p:spPr>
           <a:xfrm rot="10800000">
-            <a:off x="5587846" y="5240124"/>
-            <a:ext cx="5188553" cy="205883"/>
+            <a:off x="5935356" y="5240124"/>
+            <a:ext cx="4841042" cy="205883"/>
           </a:xfrm>
           <a:prstGeom prst="bentConnector2">
             <a:avLst/>
@@ -8146,8 +8012,8 @@
         </p:nvSpPr>
         <p:spPr>
           <a:xfrm>
-            <a:off x="10314565" y="5455465"/>
-            <a:ext cx="566181" cy="261610"/>
+            <a:off x="9573116" y="5455465"/>
+            <a:ext cx="1297150" cy="261610"/>
           </a:xfrm>
           <a:prstGeom prst="rect">
             <a:avLst/>
@@ -8165,7 +8031,7 @@
                 <a:latin typeface="Segoe UI Semibold" panose="020B0702040204020203" pitchFamily="34" charset="0"/>
                 <a:cs typeface="Segoe UI Semibold" panose="020B0702040204020203" pitchFamily="34" charset="0"/>
               </a:rPr>
-              <a:t>policy</a:t>
+              <a:t>attestation policy</a:t>
             </a:r>
           </a:p>
         </p:txBody>
@@ -8185,7 +8051,7 @@
         <p:spPr>
           <a:xfrm>
             <a:off x="9271981" y="2035980"/>
-            <a:ext cx="962123" cy="261610"/>
+            <a:ext cx="1451038" cy="261610"/>
           </a:xfrm>
           <a:prstGeom prst="rect">
             <a:avLst/>
@@ -8203,11 +8069,55 @@
                 <a:latin typeface="Segoe UI Semibold" panose="020B0702040204020203" pitchFamily="34" charset="0"/>
                 <a:cs typeface="Segoe UI Semibold" panose="020B0702040204020203" pitchFamily="34" charset="0"/>
               </a:rPr>
-              <a:t>key + policy</a:t>
-            </a:r>
-          </a:p>
-        </p:txBody>
-      </p:sp>
+              <a:t>key + release policy</a:t>
+            </a:r>
+          </a:p>
+        </p:txBody>
+      </p:sp>
+      <p:cxnSp>
+        <p:nvCxnSpPr>
+          <p:cNvPr id="40" name="Straight Arrow Connector 39">
+            <a:extLst>
+              <a:ext uri="{FF2B5EF4-FFF2-40B4-BE49-F238E27FC236}">
+                <a16:creationId xmlns:a16="http://schemas.microsoft.com/office/drawing/2014/main" id="{5DD85D2C-0CC5-238A-0640-90F9897F9E9A}"/>
+              </a:ext>
+            </a:extLst>
+          </p:cNvPr>
+          <p:cNvCxnSpPr>
+            <a:cxnSpLocks/>
+            <a:stCxn id="13" idx="2"/>
+            <a:endCxn id="17" idx="0"/>
+          </p:cNvCxnSpPr>
+          <p:nvPr/>
+        </p:nvCxnSpPr>
+        <p:spPr>
+          <a:xfrm>
+            <a:off x="6618571" y="3939171"/>
+            <a:ext cx="7453" cy="704616"/>
+          </a:xfrm>
+          <a:prstGeom prst="straightConnector1">
+            <a:avLst/>
+          </a:prstGeom>
+          <a:ln>
+            <a:headEnd type="triangle" w="med" len="med"/>
+            <a:tailEnd type="triangle" w="med" len="med"/>
+          </a:ln>
+        </p:spPr>
+        <p:style>
+          <a:lnRef idx="1">
+            <a:schemeClr val="accent1"/>
+          </a:lnRef>
+          <a:fillRef idx="0">
+            <a:schemeClr val="accent1"/>
+          </a:fillRef>
+          <a:effectRef idx="0">
+            <a:schemeClr val="accent1"/>
+          </a:effectRef>
+          <a:fontRef idx="minor">
+            <a:schemeClr val="tx1"/>
+          </a:fontRef>
+        </p:style>
+      </p:cxnSp>
     </p:spTree>
     <p:extLst>
       <p:ext uri="{BB962C8B-B14F-4D97-AF65-F5344CB8AC3E}">

</xml_diff>